<commit_message>
this is too difficult
</commit_message>
<xml_diff>
--- a/slide deck/Introduction to Public Policy.pptx
+++ b/slide deck/Introduction to Public Policy.pptx
@@ -1,13 +1,13 @@
 
 <file path=ppt/presentation.xml><?xml version="1.0" encoding="utf-8"?>
-<p:presentation xmlns:a="http://schemas.openxmlformats.org/drawingml/2006/main" xmlns:p="http://schemas.openxmlformats.org/presentationml/2006/main" xmlns:r="http://schemas.openxmlformats.org/officeDocument/2006/relationships" autoCompressPictures="0" saveSubsetFonts="1">
+<p:presentation xmlns:a="http://schemas.openxmlformats.org/drawingml/2006/main" xmlns:r="http://schemas.openxmlformats.org/officeDocument/2006/relationships" xmlns:p="http://schemas.openxmlformats.org/presentationml/2006/main" saveSubsetFonts="1" autoCompressPictures="0">
   <p:sldMasterIdLst>
     <p:sldMasterId id="2147483648" r:id="rId1"/>
   </p:sldMasterIdLst>
   <p:sldIdLst>
     <p:sldId id="256" r:id="rId2"/>
     <p:sldId id="257" r:id="rId3"/>
-    <p:sldId id="258" r:id="rId4"/>
+    <p:sldId id="263" r:id="rId4"/>
     <p:sldId id="259" r:id="rId5"/>
     <p:sldId id="260" r:id="rId6"/>
     <p:sldId id="261" r:id="rId7"/>
@@ -15,12 +15,15 @@
   </p:sldIdLst>
   <p:sldSz cx="9144000" cy="5143500" type="screen16x9"/>
   <p:notesSz cx="6858000" cy="9144000"/>
+  <p:custDataLst>
+    <p:tags r:id="rId9"/>
+  </p:custDataLst>
   <p:defaultTextStyle>
     <a:defPPr>
       <a:defRPr lang="en-US"/>
     </a:defPPr>
-    <a:lvl1pPr algn="l" defTabSz="457200" eaLnBrk="1" hangingPunct="1" latinLnBrk="0" marL="0" rtl="0">
-      <a:defRPr kern="1200" sz="1800">
+    <a:lvl1pPr marL="0" algn="l" defTabSz="457200" rtl="0" eaLnBrk="1" latinLnBrk="0" hangingPunct="1">
+      <a:defRPr sz="1800" kern="1200">
         <a:solidFill>
           <a:schemeClr val="tx1"/>
         </a:solidFill>
@@ -29,8 +32,8 @@
         <a:cs typeface="+mn-cs"/>
       </a:defRPr>
     </a:lvl1pPr>
-    <a:lvl2pPr algn="l" defTabSz="457200" eaLnBrk="1" hangingPunct="1" latinLnBrk="0" marL="457200" rtl="0">
-      <a:defRPr kern="1200" sz="1800">
+    <a:lvl2pPr marL="457200" algn="l" defTabSz="457200" rtl="0" eaLnBrk="1" latinLnBrk="0" hangingPunct="1">
+      <a:defRPr sz="1800" kern="1200">
         <a:solidFill>
           <a:schemeClr val="tx1"/>
         </a:solidFill>
@@ -39,8 +42,8 @@
         <a:cs typeface="+mn-cs"/>
       </a:defRPr>
     </a:lvl2pPr>
-    <a:lvl3pPr algn="l" defTabSz="457200" eaLnBrk="1" hangingPunct="1" latinLnBrk="0" marL="914400" rtl="0">
-      <a:defRPr kern="1200" sz="1800">
+    <a:lvl3pPr marL="914400" algn="l" defTabSz="457200" rtl="0" eaLnBrk="1" latinLnBrk="0" hangingPunct="1">
+      <a:defRPr sz="1800" kern="1200">
         <a:solidFill>
           <a:schemeClr val="tx1"/>
         </a:solidFill>
@@ -49,8 +52,8 @@
         <a:cs typeface="+mn-cs"/>
       </a:defRPr>
     </a:lvl3pPr>
-    <a:lvl4pPr algn="l" defTabSz="457200" eaLnBrk="1" hangingPunct="1" latinLnBrk="0" marL="1371600" rtl="0">
-      <a:defRPr kern="1200" sz="1800">
+    <a:lvl4pPr marL="1371600" algn="l" defTabSz="457200" rtl="0" eaLnBrk="1" latinLnBrk="0" hangingPunct="1">
+      <a:defRPr sz="1800" kern="1200">
         <a:solidFill>
           <a:schemeClr val="tx1"/>
         </a:solidFill>
@@ -59,8 +62,8 @@
         <a:cs typeface="+mn-cs"/>
       </a:defRPr>
     </a:lvl4pPr>
-    <a:lvl5pPr algn="l" defTabSz="457200" eaLnBrk="1" hangingPunct="1" latinLnBrk="0" marL="1828800" rtl="0">
-      <a:defRPr kern="1200" sz="1800">
+    <a:lvl5pPr marL="1828800" algn="l" defTabSz="457200" rtl="0" eaLnBrk="1" latinLnBrk="0" hangingPunct="1">
+      <a:defRPr sz="1800" kern="1200">
         <a:solidFill>
           <a:schemeClr val="tx1"/>
         </a:solidFill>
@@ -69,8 +72,8 @@
         <a:cs typeface="+mn-cs"/>
       </a:defRPr>
     </a:lvl5pPr>
-    <a:lvl6pPr algn="l" defTabSz="457200" eaLnBrk="1" hangingPunct="1" latinLnBrk="0" marL="2286000" rtl="0">
-      <a:defRPr kern="1200" sz="1800">
+    <a:lvl6pPr marL="2286000" algn="l" defTabSz="457200" rtl="0" eaLnBrk="1" latinLnBrk="0" hangingPunct="1">
+      <a:defRPr sz="1800" kern="1200">
         <a:solidFill>
           <a:schemeClr val="tx1"/>
         </a:solidFill>
@@ -79,8 +82,8 @@
         <a:cs typeface="+mn-cs"/>
       </a:defRPr>
     </a:lvl6pPr>
-    <a:lvl7pPr algn="l" defTabSz="457200" eaLnBrk="1" hangingPunct="1" latinLnBrk="0" marL="2743200" rtl="0">
-      <a:defRPr kern="1200" sz="1800">
+    <a:lvl7pPr marL="2743200" algn="l" defTabSz="457200" rtl="0" eaLnBrk="1" latinLnBrk="0" hangingPunct="1">
+      <a:defRPr sz="1800" kern="1200">
         <a:solidFill>
           <a:schemeClr val="tx1"/>
         </a:solidFill>
@@ -89,8 +92,8 @@
         <a:cs typeface="+mn-cs"/>
       </a:defRPr>
     </a:lvl7pPr>
-    <a:lvl8pPr algn="l" defTabSz="457200" eaLnBrk="1" hangingPunct="1" latinLnBrk="0" marL="3200400" rtl="0">
-      <a:defRPr kern="1200" sz="1800">
+    <a:lvl8pPr marL="3200400" algn="l" defTabSz="457200" rtl="0" eaLnBrk="1" latinLnBrk="0" hangingPunct="1">
+      <a:defRPr sz="1800" kern="1200">
         <a:solidFill>
           <a:schemeClr val="tx1"/>
         </a:solidFill>
@@ -99,8 +102,8 @@
         <a:cs typeface="+mn-cs"/>
       </a:defRPr>
     </a:lvl8pPr>
-    <a:lvl9pPr algn="l" defTabSz="457200" eaLnBrk="1" hangingPunct="1" latinLnBrk="0" marL="3657600" rtl="0">
-      <a:defRPr kern="1200" sz="1800">
+    <a:lvl9pPr marL="3657600" algn="l" defTabSz="457200" rtl="0" eaLnBrk="1" latinLnBrk="0" hangingPunct="1">
+      <a:defRPr sz="1800" kern="1200">
         <a:solidFill>
           <a:schemeClr val="tx1"/>
         </a:solidFill>
@@ -308,7 +311,7 @@
           <a:p>
             <a:fld id="{241EB5C9-1307-BA42-ABA2-0BC069CD8E7F}" type="datetimeFigureOut">
               <a:rPr lang="en-US" smtClean="0"/>
-              <a:t>1/2/22</a:t>
+              <a:t>8/26/24</a:t>
             </a:fld>
             <a:endParaRPr lang="en-US"/>
           </a:p>
@@ -476,7 +479,7 @@
           <a:p>
             <a:fld id="{241EB5C9-1307-BA42-ABA2-0BC069CD8E7F}" type="datetimeFigureOut">
               <a:rPr lang="en-US" smtClean="0"/>
-              <a:t>1/2/22</a:t>
+              <a:t>8/26/24</a:t>
             </a:fld>
             <a:endParaRPr lang="en-US"/>
           </a:p>
@@ -654,7 +657,7 @@
           <a:p>
             <a:fld id="{241EB5C9-1307-BA42-ABA2-0BC069CD8E7F}" type="datetimeFigureOut">
               <a:rPr lang="en-US" smtClean="0"/>
-              <a:t>1/2/22</a:t>
+              <a:t>8/26/24</a:t>
             </a:fld>
             <a:endParaRPr lang="en-US"/>
           </a:p>
@@ -822,7 +825,7 @@
           <a:p>
             <a:fld id="{241EB5C9-1307-BA42-ABA2-0BC069CD8E7F}" type="datetimeFigureOut">
               <a:rPr lang="en-US" smtClean="0"/>
-              <a:t>1/2/22</a:t>
+              <a:t>8/26/24</a:t>
             </a:fld>
             <a:endParaRPr lang="en-US"/>
           </a:p>
@@ -1067,7 +1070,7 @@
           <a:p>
             <a:fld id="{241EB5C9-1307-BA42-ABA2-0BC069CD8E7F}" type="datetimeFigureOut">
               <a:rPr lang="en-US" smtClean="0"/>
-              <a:t>1/2/22</a:t>
+              <a:t>8/26/24</a:t>
             </a:fld>
             <a:endParaRPr lang="en-US"/>
           </a:p>
@@ -1352,7 +1355,7 @@
           <a:p>
             <a:fld id="{241EB5C9-1307-BA42-ABA2-0BC069CD8E7F}" type="datetimeFigureOut">
               <a:rPr lang="en-US" smtClean="0"/>
-              <a:t>1/2/22</a:t>
+              <a:t>8/26/24</a:t>
             </a:fld>
             <a:endParaRPr lang="en-US"/>
           </a:p>
@@ -1771,7 +1774,7 @@
           <a:p>
             <a:fld id="{241EB5C9-1307-BA42-ABA2-0BC069CD8E7F}" type="datetimeFigureOut">
               <a:rPr lang="en-US" smtClean="0"/>
-              <a:t>1/2/22</a:t>
+              <a:t>8/26/24</a:t>
             </a:fld>
             <a:endParaRPr lang="en-US"/>
           </a:p>
@@ -1888,7 +1891,7 @@
           <a:p>
             <a:fld id="{241EB5C9-1307-BA42-ABA2-0BC069CD8E7F}" type="datetimeFigureOut">
               <a:rPr lang="en-US" smtClean="0"/>
-              <a:t>1/2/22</a:t>
+              <a:t>8/26/24</a:t>
             </a:fld>
             <a:endParaRPr lang="en-US"/>
           </a:p>
@@ -1983,7 +1986,7 @@
           <a:p>
             <a:fld id="{241EB5C9-1307-BA42-ABA2-0BC069CD8E7F}" type="datetimeFigureOut">
               <a:rPr lang="en-US" smtClean="0"/>
-              <a:t>1/2/22</a:t>
+              <a:t>8/26/24</a:t>
             </a:fld>
             <a:endParaRPr lang="en-US"/>
           </a:p>
@@ -2258,7 +2261,7 @@
           <a:p>
             <a:fld id="{241EB5C9-1307-BA42-ABA2-0BC069CD8E7F}" type="datetimeFigureOut">
               <a:rPr lang="en-US" smtClean="0"/>
-              <a:t>1/2/22</a:t>
+              <a:t>8/26/24</a:t>
             </a:fld>
             <a:endParaRPr lang="en-US"/>
           </a:p>
@@ -2510,7 +2513,7 @@
           <a:p>
             <a:fld id="{241EB5C9-1307-BA42-ABA2-0BC069CD8E7F}" type="datetimeFigureOut">
               <a:rPr lang="en-US" smtClean="0"/>
-              <a:t>1/2/22</a:t>
+              <a:t>8/26/24</a:t>
             </a:fld>
             <a:endParaRPr lang="en-US"/>
           </a:p>
@@ -2572,7 +2575,7 @@
 </file>
 
 <file path=ppt/slideMasters/slideMaster1.xml><?xml version="1.0" encoding="utf-8"?>
-<p:sldMaster xmlns:a="http://schemas.openxmlformats.org/drawingml/2006/main" xmlns:p="http://schemas.openxmlformats.org/presentationml/2006/main" xmlns:r="http://schemas.openxmlformats.org/officeDocument/2006/relationships">
+<p:sldMaster xmlns:a="http://schemas.openxmlformats.org/drawingml/2006/main" xmlns:r="http://schemas.openxmlformats.org/officeDocument/2006/relationships" xmlns:p="http://schemas.openxmlformats.org/presentationml/2006/main">
   <p:cSld>
     <p:bg>
       <p:bgRef idx="1001">
@@ -2613,7 +2616,7 @@
           </a:prstGeom>
         </p:spPr>
         <p:txBody>
-          <a:bodyPr anchor="ctr" bIns="45720" lIns="91440" rIns="91440" rtlCol="0" tIns="45720" vert="horz">
+          <a:bodyPr vert="horz" lIns="91440" tIns="45720" rIns="91440" bIns="45720" rtlCol="0" anchor="ctr">
             <a:normAutofit/>
           </a:bodyPr>
           <a:lstStyle/>
@@ -2632,7 +2635,7 @@
             <a:spLocks noGrp="1"/>
           </p:cNvSpPr>
           <p:nvPr>
-            <p:ph idx="1" type="body"/>
+            <p:ph type="body" idx="1"/>
           </p:nvPr>
         </p:nvSpPr>
         <p:spPr>
@@ -2645,7 +2648,7 @@
           </a:prstGeom>
         </p:spPr>
         <p:txBody>
-          <a:bodyPr bIns="45720" lIns="91440" rIns="91440" rtlCol="0" tIns="45720" vert="horz">
+          <a:bodyPr vert="horz" lIns="91440" tIns="45720" rIns="91440" bIns="45720" rtlCol="0">
             <a:normAutofit/>
           </a:bodyPr>
           <a:lstStyle/>
@@ -2693,7 +2696,7 @@
             <a:spLocks noGrp="1"/>
           </p:cNvSpPr>
           <p:nvPr>
-            <p:ph idx="2" sz="half" type="dt"/>
+            <p:ph type="dt" sz="half" idx="2"/>
           </p:nvPr>
         </p:nvSpPr>
         <p:spPr>
@@ -2706,7 +2709,7 @@
           </a:prstGeom>
         </p:spPr>
         <p:txBody>
-          <a:bodyPr anchor="ctr" bIns="45720" lIns="91440" rIns="91440" rtlCol="0" tIns="45720" vert="horz"/>
+          <a:bodyPr vert="horz" lIns="91440" tIns="45720" rIns="91440" bIns="45720" rtlCol="0" anchor="ctr"/>
           <a:lstStyle>
             <a:lvl1pPr algn="l">
               <a:defRPr sz="900">
@@ -2721,7 +2724,7 @@
           <a:p>
             <a:fld id="{241EB5C9-1307-BA42-ABA2-0BC069CD8E7F}" type="datetimeFigureOut">
               <a:rPr lang="en-US" smtClean="0"/>
-              <a:t>1/2/22</a:t>
+              <a:t>8/26/24</a:t>
             </a:fld>
             <a:endParaRPr lang="en-US"/>
           </a:p>
@@ -2734,7 +2737,7 @@
             <a:spLocks noGrp="1"/>
           </p:cNvSpPr>
           <p:nvPr>
-            <p:ph idx="3" sz="quarter" type="ftr"/>
+            <p:ph type="ftr" sz="quarter" idx="3"/>
           </p:nvPr>
         </p:nvSpPr>
         <p:spPr>
@@ -2747,7 +2750,7 @@
           </a:prstGeom>
         </p:spPr>
         <p:txBody>
-          <a:bodyPr anchor="ctr" bIns="45720" lIns="91440" rIns="91440" rtlCol="0" tIns="45720" vert="horz"/>
+          <a:bodyPr vert="horz" lIns="91440" tIns="45720" rIns="91440" bIns="45720" rtlCol="0" anchor="ctr"/>
           <a:lstStyle>
             <a:lvl1pPr algn="ctr">
               <a:defRPr sz="900">
@@ -2771,7 +2774,7 @@
             <a:spLocks noGrp="1"/>
           </p:cNvSpPr>
           <p:nvPr>
-            <p:ph idx="4" sz="quarter" type="sldNum"/>
+            <p:ph type="sldNum" sz="quarter" idx="4"/>
           </p:nvPr>
         </p:nvSpPr>
         <p:spPr>
@@ -2784,7 +2787,7 @@
           </a:prstGeom>
         </p:spPr>
         <p:txBody>
-          <a:bodyPr anchor="ctr" bIns="45720" lIns="91440" rIns="91440" rtlCol="0" tIns="45720" vert="horz"/>
+          <a:bodyPr vert="horz" lIns="91440" tIns="45720" rIns="91440" bIns="45720" rtlCol="0" anchor="ctr"/>
           <a:lstStyle>
             <a:lvl1pPr algn="r">
               <a:defRPr sz="900">
@@ -2812,7 +2815,7 @@
       </p:ext>
     </p:extLst>
   </p:cSld>
-  <p:clrMap accent1="accent1" accent2="accent2" accent3="accent3" accent4="accent4" accent5="accent5" accent6="accent6" bg1="lt1" bg2="lt2" folHlink="folHlink" hlink="hlink" tx1="dk1" tx2="dk2"/>
+  <p:clrMap bg1="lt1" tx1="dk1" bg2="lt2" tx2="dk2" accent1="accent1" accent2="accent2" accent3="accent3" accent4="accent4" accent5="accent5" accent6="accent6" hlink="hlink" folHlink="folHlink"/>
   <p:sldLayoutIdLst>
     <p:sldLayoutId id="2147483649" r:id="rId1"/>
     <p:sldLayoutId id="2147483650" r:id="rId2"/>
@@ -2828,12 +2831,12 @@
   </p:sldLayoutIdLst>
   <p:txStyles>
     <p:titleStyle>
-      <a:lvl1pPr algn="ctr" defTabSz="342900" eaLnBrk="1" hangingPunct="1" latinLnBrk="0" rtl="0">
+      <a:lvl1pPr algn="ctr" defTabSz="342900" rtl="0" eaLnBrk="1" latinLnBrk="0" hangingPunct="1">
         <a:spcBef>
           <a:spcPct val="0"/>
         </a:spcBef>
         <a:buNone/>
-        <a:defRPr kern="1200" sz="3300">
+        <a:defRPr sz="3300" kern="1200">
           <a:solidFill>
             <a:schemeClr val="tx1"/>
           </a:solidFill>
@@ -2844,13 +2847,13 @@
       </a:lvl1pPr>
     </p:titleStyle>
     <p:bodyStyle>
-      <a:lvl1pPr algn="l" defTabSz="342900" eaLnBrk="1" hangingPunct="1" indent="-342900" latinLnBrk="0" marL="342900" rtl="0">
+      <a:lvl1pPr marL="342900" indent="-342900" algn="l" defTabSz="342900" rtl="0" eaLnBrk="1" latinLnBrk="0" hangingPunct="1">
         <a:spcBef>
           <a:spcPct val="20000"/>
         </a:spcBef>
         <a:buFont typeface="Arial"/>
         <a:buChar char="•"/>
-        <a:defRPr kern="1200" sz="2400">
+        <a:defRPr sz="2400" kern="1200">
           <a:solidFill>
             <a:schemeClr val="tx1"/>
           </a:solidFill>
@@ -2859,13 +2862,13 @@
           <a:cs typeface="+mn-cs"/>
         </a:defRPr>
       </a:lvl1pPr>
-      <a:lvl2pPr algn="l" defTabSz="342900" eaLnBrk="1" hangingPunct="1" indent="-342900" latinLnBrk="0" marL="685800" rtl="0">
+      <a:lvl2pPr marL="685800" indent="-342900" algn="l" defTabSz="342900" rtl="0" eaLnBrk="1" latinLnBrk="0" hangingPunct="1">
         <a:spcBef>
           <a:spcPct val="20000"/>
         </a:spcBef>
         <a:buFont typeface="Arial"/>
         <a:buChar char="–"/>
-        <a:defRPr kern="1200" sz="2100">
+        <a:defRPr sz="2100" kern="1200">
           <a:solidFill>
             <a:schemeClr val="tx1"/>
           </a:solidFill>
@@ -2874,13 +2877,13 @@
           <a:cs typeface="+mn-cs"/>
         </a:defRPr>
       </a:lvl2pPr>
-      <a:lvl3pPr algn="l" defTabSz="342900" eaLnBrk="1" hangingPunct="1" indent="-342900" latinLnBrk="0" marL="1028700" rtl="0">
+      <a:lvl3pPr marL="1028700" indent="-342900" algn="l" defTabSz="342900" rtl="0" eaLnBrk="1" latinLnBrk="0" hangingPunct="1">
         <a:spcBef>
           <a:spcPct val="20000"/>
         </a:spcBef>
         <a:buFont typeface="Arial"/>
         <a:buChar char="•"/>
-        <a:defRPr kern="1200" sz="1800">
+        <a:defRPr sz="1800" kern="1200">
           <a:solidFill>
             <a:schemeClr val="tx1"/>
           </a:solidFill>
@@ -2889,13 +2892,13 @@
           <a:cs typeface="+mn-cs"/>
         </a:defRPr>
       </a:lvl3pPr>
-      <a:lvl4pPr algn="l" defTabSz="342900" eaLnBrk="1" hangingPunct="1" indent="-342900" latinLnBrk="0" marL="1371600" rtl="0">
+      <a:lvl4pPr marL="1371600" indent="-342900" algn="l" defTabSz="342900" rtl="0" eaLnBrk="1" latinLnBrk="0" hangingPunct="1">
         <a:spcBef>
           <a:spcPct val="20000"/>
         </a:spcBef>
         <a:buFont typeface="Arial"/>
         <a:buChar char="–"/>
-        <a:defRPr kern="1200" sz="1500">
+        <a:defRPr sz="1500" kern="1200">
           <a:solidFill>
             <a:schemeClr val="tx1"/>
           </a:solidFill>
@@ -2904,13 +2907,13 @@
           <a:cs typeface="+mn-cs"/>
         </a:defRPr>
       </a:lvl4pPr>
-      <a:lvl5pPr algn="l" defTabSz="342900" eaLnBrk="1" hangingPunct="1" indent="-342900" latinLnBrk="0" marL="1714500" rtl="0">
+      <a:lvl5pPr marL="1714500" indent="-342900" algn="l" defTabSz="342900" rtl="0" eaLnBrk="1" latinLnBrk="0" hangingPunct="1">
         <a:spcBef>
           <a:spcPct val="20000"/>
         </a:spcBef>
         <a:buFont typeface="Arial"/>
         <a:buChar char="»"/>
-        <a:defRPr kern="1200" sz="1500">
+        <a:defRPr sz="1500" kern="1200">
           <a:solidFill>
             <a:schemeClr val="tx1"/>
           </a:solidFill>
@@ -2919,13 +2922,13 @@
           <a:cs typeface="+mn-cs"/>
         </a:defRPr>
       </a:lvl5pPr>
-      <a:lvl6pPr algn="l" defTabSz="342900" eaLnBrk="1" hangingPunct="1" indent="-342900" latinLnBrk="0" marL="2057400" rtl="0">
+      <a:lvl6pPr marL="2057400" indent="-342900" algn="l" defTabSz="342900" rtl="0" eaLnBrk="1" latinLnBrk="0" hangingPunct="1">
         <a:spcBef>
           <a:spcPct val="20000"/>
         </a:spcBef>
         <a:buFont typeface="Arial"/>
         <a:buChar char="•"/>
-        <a:defRPr kern="1200" sz="1500">
+        <a:defRPr sz="1500" kern="1200">
           <a:solidFill>
             <a:schemeClr val="tx1"/>
           </a:solidFill>
@@ -2934,13 +2937,13 @@
           <a:cs typeface="+mn-cs"/>
         </a:defRPr>
       </a:lvl6pPr>
-      <a:lvl7pPr algn="l" defTabSz="342900" eaLnBrk="1" hangingPunct="1" indent="-342900" latinLnBrk="0" marL="2400300" rtl="0">
+      <a:lvl7pPr marL="2400300" indent="-342900" algn="l" defTabSz="342900" rtl="0" eaLnBrk="1" latinLnBrk="0" hangingPunct="1">
         <a:spcBef>
           <a:spcPct val="20000"/>
         </a:spcBef>
         <a:buFont typeface="Arial"/>
         <a:buChar char="•"/>
-        <a:defRPr kern="1200" sz="1500">
+        <a:defRPr sz="1500" kern="1200">
           <a:solidFill>
             <a:schemeClr val="tx1"/>
           </a:solidFill>
@@ -2949,13 +2952,13 @@
           <a:cs typeface="+mn-cs"/>
         </a:defRPr>
       </a:lvl7pPr>
-      <a:lvl8pPr algn="l" defTabSz="342900" eaLnBrk="1" hangingPunct="1" indent="-342900" latinLnBrk="0" marL="2743200" rtl="0">
+      <a:lvl8pPr marL="2743200" indent="-342900" algn="l" defTabSz="342900" rtl="0" eaLnBrk="1" latinLnBrk="0" hangingPunct="1">
         <a:spcBef>
           <a:spcPct val="20000"/>
         </a:spcBef>
         <a:buFont typeface="Arial"/>
         <a:buChar char="•"/>
-        <a:defRPr kern="1200" sz="1500">
+        <a:defRPr sz="1500" kern="1200">
           <a:solidFill>
             <a:schemeClr val="tx1"/>
           </a:solidFill>
@@ -2964,13 +2967,13 @@
           <a:cs typeface="+mn-cs"/>
         </a:defRPr>
       </a:lvl8pPr>
-      <a:lvl9pPr algn="l" defTabSz="342900" eaLnBrk="1" hangingPunct="1" indent="-342900" latinLnBrk="0" marL="3086100" rtl="0">
+      <a:lvl9pPr marL="3086100" indent="-342900" algn="l" defTabSz="342900" rtl="0" eaLnBrk="1" latinLnBrk="0" hangingPunct="1">
         <a:spcBef>
           <a:spcPct val="20000"/>
         </a:spcBef>
         <a:buFont typeface="Arial"/>
         <a:buChar char="•"/>
-        <a:defRPr kern="1200" sz="1500">
+        <a:defRPr sz="1500" kern="1200">
           <a:solidFill>
             <a:schemeClr val="tx1"/>
           </a:solidFill>
@@ -2984,8 +2987,8 @@
       <a:defPPr>
         <a:defRPr lang="en-US"/>
       </a:defPPr>
-      <a:lvl1pPr algn="l" defTabSz="342900" eaLnBrk="1" hangingPunct="1" latinLnBrk="0" marL="0" rtl="0">
-        <a:defRPr kern="1200" sz="1350">
+      <a:lvl1pPr marL="0" algn="l" defTabSz="342900" rtl="0" eaLnBrk="1" latinLnBrk="0" hangingPunct="1">
+        <a:defRPr sz="1350" kern="1200">
           <a:solidFill>
             <a:schemeClr val="tx1"/>
           </a:solidFill>
@@ -2994,8 +2997,8 @@
           <a:cs typeface="+mn-cs"/>
         </a:defRPr>
       </a:lvl1pPr>
-      <a:lvl2pPr algn="l" defTabSz="342900" eaLnBrk="1" hangingPunct="1" latinLnBrk="0" marL="342900" rtl="0">
-        <a:defRPr kern="1200" sz="1350">
+      <a:lvl2pPr marL="342900" algn="l" defTabSz="342900" rtl="0" eaLnBrk="1" latinLnBrk="0" hangingPunct="1">
+        <a:defRPr sz="1350" kern="1200">
           <a:solidFill>
             <a:schemeClr val="tx1"/>
           </a:solidFill>
@@ -3004,8 +3007,8 @@
           <a:cs typeface="+mn-cs"/>
         </a:defRPr>
       </a:lvl2pPr>
-      <a:lvl3pPr algn="l" defTabSz="342900" eaLnBrk="1" hangingPunct="1" latinLnBrk="0" marL="685800" rtl="0">
-        <a:defRPr kern="1200" sz="1350">
+      <a:lvl3pPr marL="685800" algn="l" defTabSz="342900" rtl="0" eaLnBrk="1" latinLnBrk="0" hangingPunct="1">
+        <a:defRPr sz="1350" kern="1200">
           <a:solidFill>
             <a:schemeClr val="tx1"/>
           </a:solidFill>
@@ -3014,8 +3017,8 @@
           <a:cs typeface="+mn-cs"/>
         </a:defRPr>
       </a:lvl3pPr>
-      <a:lvl4pPr algn="l" defTabSz="342900" eaLnBrk="1" hangingPunct="1" latinLnBrk="0" marL="1028700" rtl="0">
-        <a:defRPr kern="1200" sz="1350">
+      <a:lvl4pPr marL="1028700" algn="l" defTabSz="342900" rtl="0" eaLnBrk="1" latinLnBrk="0" hangingPunct="1">
+        <a:defRPr sz="1350" kern="1200">
           <a:solidFill>
             <a:schemeClr val="tx1"/>
           </a:solidFill>
@@ -3024,8 +3027,8 @@
           <a:cs typeface="+mn-cs"/>
         </a:defRPr>
       </a:lvl4pPr>
-      <a:lvl5pPr algn="l" defTabSz="342900" eaLnBrk="1" hangingPunct="1" latinLnBrk="0" marL="1371600" rtl="0">
-        <a:defRPr kern="1200" sz="1350">
+      <a:lvl5pPr marL="1371600" algn="l" defTabSz="342900" rtl="0" eaLnBrk="1" latinLnBrk="0" hangingPunct="1">
+        <a:defRPr sz="1350" kern="1200">
           <a:solidFill>
             <a:schemeClr val="tx1"/>
           </a:solidFill>
@@ -3034,8 +3037,8 @@
           <a:cs typeface="+mn-cs"/>
         </a:defRPr>
       </a:lvl5pPr>
-      <a:lvl6pPr algn="l" defTabSz="342900" eaLnBrk="1" hangingPunct="1" latinLnBrk="0" marL="1714500" rtl="0">
-        <a:defRPr kern="1200" sz="1350">
+      <a:lvl6pPr marL="1714500" algn="l" defTabSz="342900" rtl="0" eaLnBrk="1" latinLnBrk="0" hangingPunct="1">
+        <a:defRPr sz="1350" kern="1200">
           <a:solidFill>
             <a:schemeClr val="tx1"/>
           </a:solidFill>
@@ -3044,8 +3047,8 @@
           <a:cs typeface="+mn-cs"/>
         </a:defRPr>
       </a:lvl6pPr>
-      <a:lvl7pPr algn="l" defTabSz="342900" eaLnBrk="1" hangingPunct="1" latinLnBrk="0" marL="2057400" rtl="0">
-        <a:defRPr kern="1200" sz="1350">
+      <a:lvl7pPr marL="2057400" algn="l" defTabSz="342900" rtl="0" eaLnBrk="1" latinLnBrk="0" hangingPunct="1">
+        <a:defRPr sz="1350" kern="1200">
           <a:solidFill>
             <a:schemeClr val="tx1"/>
           </a:solidFill>
@@ -3054,8 +3057,8 @@
           <a:cs typeface="+mn-cs"/>
         </a:defRPr>
       </a:lvl7pPr>
-      <a:lvl8pPr algn="l" defTabSz="342900" eaLnBrk="1" hangingPunct="1" latinLnBrk="0" marL="2400300" rtl="0">
-        <a:defRPr kern="1200" sz="1350">
+      <a:lvl8pPr marL="2400300" algn="l" defTabSz="342900" rtl="0" eaLnBrk="1" latinLnBrk="0" hangingPunct="1">
+        <a:defRPr sz="1350" kern="1200">
           <a:solidFill>
             <a:schemeClr val="tx1"/>
           </a:solidFill>
@@ -3064,8 +3067,8 @@
           <a:cs typeface="+mn-cs"/>
         </a:defRPr>
       </a:lvl8pPr>
-      <a:lvl9pPr algn="l" defTabSz="342900" eaLnBrk="1" hangingPunct="1" latinLnBrk="0" marL="2743200" rtl="0">
-        <a:defRPr kern="1200" sz="1350">
+      <a:lvl9pPr marL="2743200" algn="l" defTabSz="342900" rtl="0" eaLnBrk="1" latinLnBrk="0" hangingPunct="1">
+        <a:defRPr sz="1350" kern="1200">
           <a:solidFill>
             <a:schemeClr val="tx1"/>
           </a:solidFill>
@@ -3111,11 +3114,10 @@
           <a:bodyPr/>
           <a:lstStyle/>
           <a:p>
-            <a:pPr lvl="0" indent="0" marL="0">
+            <a:pPr marL="0" lvl="0" indent="0">
               <a:buNone/>
             </a:pPr>
             <a:r>
-              <a:rPr/>
               <a:t>Introduction to Public Policy</a:t>
             </a:r>
           </a:p>
@@ -3136,20 +3138,30 @@
           <a:bodyPr/>
           <a:lstStyle/>
           <a:p>
-            <a:pPr lvl="0" indent="0" marL="0">
+            <a:pPr marL="0" lvl="0" indent="0">
               <a:buNone/>
             </a:pPr>
             <a:r>
-              <a:rPr b="1"/>
+              <a:rPr b="1" dirty="0"/>
               <a:t>POSC 315</a:t>
             </a:r>
-          </a:p>
-          <a:p>
-            <a:pPr lvl="0" indent="0" marL="0">
+            <a:r>
+              <a:rPr lang="en-US" b="1" dirty="0"/>
+              <a:t>-01</a:t>
+            </a:r>
+          </a:p>
+          <a:p>
+            <a:pPr marL="0" lvl="0" indent="0">
               <a:buNone/>
             </a:pPr>
-            <a:r>
-              <a:rPr/>
+            <a:endParaRPr b="1" dirty="0"/>
+          </a:p>
+          <a:p>
+            <a:pPr marL="0" lvl="0" indent="0">
+              <a:buNone/>
+            </a:pPr>
+            <a:r>
+              <a:rPr dirty="0"/>
               <a:t>Dr. David P. Adams, Ph.D.</a:t>
             </a:r>
           </a:p>
@@ -3157,6 +3169,9 @@
       </p:sp>
     </p:spTree>
   </p:cSld>
+  <p:clrMapOvr>
+    <a:masterClrMapping/>
+  </p:clrMapOvr>
 </p:sld>
 </file>
 
@@ -3190,18 +3205,20 @@
         <p:spPr>
           <a:xfrm>
             <a:off x="457201" y="204787"/>
-            <a:ext cx="3008313" cy="871538"/>
+            <a:ext cx="5299543" cy="871538"/>
           </a:xfrm>
         </p:spPr>
         <p:txBody>
-          <a:bodyPr/>
-          <a:lstStyle/>
-          <a:p>
-            <a:pPr lvl="0" indent="0" marL="0">
+          <a:bodyPr>
+            <a:normAutofit fontScale="90000"/>
+          </a:bodyPr>
+          <a:lstStyle/>
+          <a:p>
+            <a:pPr marL="0" lvl="0" indent="0">
               <a:buNone/>
             </a:pPr>
             <a:r>
-              <a:rPr/>
+              <a:rPr sz="2800" dirty="0"/>
               <a:t>Introduction and Syllabus Overview</a:t>
             </a:r>
           </a:p>
@@ -3214,19 +3231,26 @@
             <a:spLocks noGrp="1"/>
           </p:cNvSpPr>
           <p:nvPr>
-            <p:ph idx="2" sz="half" type="body"/>
-          </p:nvPr>
-        </p:nvSpPr>
-        <p:spPr/>
-        <p:txBody>
-          <a:bodyPr/>
-          <a:lstStyle/>
-          <a:p>
-            <a:pPr lvl="0" indent="0" marL="0">
+            <p:ph type="body" sz="half" idx="2"/>
+          </p:nvPr>
+        </p:nvSpPr>
+        <p:spPr>
+          <a:xfrm>
+            <a:off x="457201" y="2107096"/>
+            <a:ext cx="3008313" cy="2487527"/>
+          </a:xfrm>
+        </p:spPr>
+        <p:txBody>
+          <a:bodyPr>
+            <a:normAutofit/>
+          </a:bodyPr>
+          <a:lstStyle/>
+          <a:p>
+            <a:pPr marL="0" lvl="0" indent="0">
               <a:buNone/>
             </a:pPr>
             <a:r>
-              <a:rPr>
+              <a:rPr sz="2400" dirty="0">
                 <a:hlinkClick r:id="rId2"/>
               </a:rPr>
               <a:t>POSC 315 Syllabus</a:t>
@@ -3236,7 +3260,7 @@
       </p:sp>
       <p:pic>
         <p:nvPicPr>
-          <p:cNvPr descr="images/syllabus.jpeg" id="0" name="Picture 1"/>
+          <p:cNvPr id="3" name="Picture 1" descr="images/syllabus.jpeg"/>
           <p:cNvPicPr>
             <a:picLocks noGrp="1" noChangeAspect="1"/>
           </p:cNvPicPr>
@@ -3250,8 +3274,8 @@
         </p:blipFill>
         <p:spPr bwMode="auto">
           <a:xfrm>
-            <a:off x="3568700" y="444500"/>
-            <a:ext cx="5105400" cy="3403600"/>
+            <a:off x="4016204" y="1208598"/>
+            <a:ext cx="4824476" cy="3216317"/>
           </a:xfrm>
           <a:prstGeom prst="rect">
             <a:avLst/>
@@ -3264,44 +3288,25 @@
           </a:ln>
         </p:spPr>
       </p:pic>
-      <p:sp>
-        <p:nvSpPr>
-          <p:cNvPr id="1" name="TextBox 3"/>
-          <p:cNvSpPr txBox="1"/>
-          <p:nvPr/>
-        </p:nvSpPr>
-        <p:spPr>
-          <a:xfrm>
-            <a:off x="3568700" y="4076700"/>
-            <a:ext cx="5105400" cy="508000"/>
-          </a:xfrm>
-          <a:prstGeom prst="rect">
-            <a:avLst/>
-          </a:prstGeom>
-          <a:noFill/>
-        </p:spPr>
-        <p:txBody>
-          <a:bodyPr/>
-          <a:lstStyle/>
-          <a:p>
-            <a:pPr lvl="0" indent="0" marL="0" algn="ctr">
-              <a:buNone/>
-            </a:pPr>
-            <a:r>
-              <a:rPr/>
-              <a:t>Syllabus</a:t>
-            </a:r>
-          </a:p>
-        </p:txBody>
-      </p:sp>
     </p:spTree>
   </p:cSld>
+  <p:clrMapOvr>
+    <a:masterClrMapping/>
+  </p:clrMapOvr>
 </p:sld>
 </file>
 
 <file path=ppt/slides/slide3.xml><?xml version="1.0" encoding="utf-8"?>
-<p:sld xmlns:a="http://schemas.openxmlformats.org/drawingml/2006/main" xmlns:r="http://schemas.openxmlformats.org/officeDocument/2006/relationships" xmlns:p="http://schemas.openxmlformats.org/presentationml/2006/main">
+<p:sld xmlns:a="http://schemas.openxmlformats.org/drawingml/2006/main" xmlns:r="http://schemas.openxmlformats.org/officeDocument/2006/relationships" xmlns:p="http://schemas.openxmlformats.org/presentationml/2006/main" showMasterSp="0">
   <p:cSld>
+    <p:bg>
+      <p:bgPr>
+        <a:solidFill>
+          <a:srgbClr val="FFFFFF"/>
+        </a:solidFill>
+        <a:effectLst/>
+      </p:bgPr>
+    </p:bg>
     <p:spTree>
       <p:nvGrpSpPr>
         <p:cNvPr id="1" name=""/>
@@ -3316,58 +3321,243 @@
           <a:chExt cx="0" cy="0"/>
         </a:xfrm>
       </p:grpSpPr>
-      <p:sp>
-        <p:nvSpPr>
-          <p:cNvPr id="2" name="Title 1"/>
-          <p:cNvSpPr>
-            <a:spLocks noGrp="1"/>
-          </p:cNvSpPr>
-          <p:nvPr>
-            <p:ph type="title"/>
-          </p:nvPr>
-        </p:nvSpPr>
-        <p:spPr/>
-        <p:txBody>
-          <a:bodyPr/>
-          <a:lstStyle/>
-          <a:p>
-            <a:pPr lvl="0" indent="0" marL="0">
-              <a:buNone/>
-            </a:pPr>
-            <a:r>
-              <a:rPr/>
-              <a:t>Defining Public Policy</a:t>
-            </a:r>
-          </a:p>
-        </p:txBody>
-      </p:sp>
-      <p:sp>
-        <p:nvSpPr>
-          <p:cNvPr id="3" name="Content Placeholder 2"/>
-          <p:cNvSpPr>
-            <a:spLocks noGrp="1"/>
-          </p:cNvSpPr>
-          <p:nvPr>
-            <p:ph idx="1"/>
-          </p:nvPr>
-        </p:nvSpPr>
-        <p:spPr/>
-        <p:txBody>
-          <a:bodyPr/>
-          <a:lstStyle/>
-          <a:p>
-            <a:pPr lvl="0" indent="0" marL="0">
-              <a:buNone/>
-            </a:pPr>
-            <a:r>
-              <a:rPr b="1"/>
+      <p:pic>
+        <p:nvPicPr>
+          <p:cNvPr id="5" name="Graphic 4">
+            <a:extLst>
+              <a:ext uri="{FF2B5EF4-FFF2-40B4-BE49-F238E27FC236}">
+                <a16:creationId xmlns:a16="http://schemas.microsoft.com/office/drawing/2014/main" id="{9726601B-F6CC-BD09-73CD-1FEC0754EDCF}"/>
+              </a:ext>
+            </a:extLst>
+          </p:cNvPr>
+          <p:cNvPicPr>
+            <a:picLocks/>
+          </p:cNvPicPr>
+          <p:nvPr>
+            <p:custDataLst>
+              <p:tags r:id="rId2"/>
+            </p:custDataLst>
+          </p:nvPr>
+        </p:nvPicPr>
+        <p:blipFill>
+          <a:blip r:embed="rId6">
+            <a:extLst>
+              <a:ext uri="{96DAC541-7B7A-43D3-8B79-37D633B846F1}">
+                <asvg:svgBlip xmlns:asvg="http://schemas.microsoft.com/office/drawing/2016/SVG/main" r:embed="rId7"/>
+              </a:ext>
+            </a:extLst>
+          </a:blip>
+          <a:stretch>
+            <a:fillRect/>
+          </a:stretch>
+        </p:blipFill>
+        <p:spPr>
+          <a:xfrm>
+            <a:off x="868680" y="1703070"/>
+            <a:ext cx="1737360" cy="1737360"/>
+          </a:xfrm>
+          <a:prstGeom prst="rect">
+            <a:avLst/>
+          </a:prstGeom>
+        </p:spPr>
+      </p:pic>
+      <p:sp>
+        <p:nvSpPr>
+          <p:cNvPr id="6" name="Rectangle 5">
+            <a:extLst>
+              <a:ext uri="{FF2B5EF4-FFF2-40B4-BE49-F238E27FC236}">
+                <a16:creationId xmlns:a16="http://schemas.microsoft.com/office/drawing/2014/main" id="{91B2DF47-9BBF-F830-7A82-60342BA356B8}"/>
+              </a:ext>
+            </a:extLst>
+          </p:cNvPr>
+          <p:cNvSpPr/>
+          <p:nvPr>
+            <p:custDataLst>
+              <p:tags r:id="rId3"/>
+            </p:custDataLst>
+          </p:nvPr>
+        </p:nvSpPr>
+        <p:spPr>
+          <a:xfrm>
+            <a:off x="2926080" y="1928813"/>
+            <a:ext cx="5486400" cy="1285875"/>
+          </a:xfrm>
+          <a:prstGeom prst="rect">
+            <a:avLst/>
+          </a:prstGeom>
+          <a:noFill/>
+          <a:ln w="9525" cap="flat" cmpd="sng" algn="ctr">
+            <a:solidFill>
+              <a:srgbClr val="FFFFFF"/>
+            </a:solidFill>
+            <a:prstDash val="solid"/>
+          </a:ln>
+          <a:effectLst>
+            <a:outerShdw blurRad="40000" dist="23000" dir="5400000" rotWithShape="0">
+              <a:srgbClr val="000000">
+                <a:alpha val="35000"/>
+              </a:srgbClr>
+            </a:outerShdw>
+          </a:effectLst>
+          <a:extLst>
+            <a:ext uri="{909E8E84-426E-40DD-AFC4-6F175D3DCCD1}">
+              <a14:hiddenFill xmlns:a14="http://schemas.microsoft.com/office/drawing/2010/main">
+                <a:gradFill rotWithShape="1">
+                  <a:gsLst>
+                    <a:gs pos="0">
+                      <a:schemeClr val="accent1">
+                        <a:tint val="100000"/>
+                        <a:shade val="100000"/>
+                        <a:satMod val="130000"/>
+                      </a:schemeClr>
+                    </a:gs>
+                    <a:gs pos="100000">
+                      <a:schemeClr val="accent1">
+                        <a:tint val="50000"/>
+                        <a:shade val="100000"/>
+                        <a:satMod val="350000"/>
+                      </a:schemeClr>
+                    </a:gs>
+                  </a:gsLst>
+                  <a:lin ang="16200000" scaled="0"/>
+                </a:gradFill>
+              </a14:hiddenFill>
+            </a:ext>
+          </a:extLst>
+        </p:spPr>
+        <p:style>
+          <a:lnRef idx="1">
+            <a:schemeClr val="accent1"/>
+          </a:lnRef>
+          <a:fillRef idx="3">
+            <a:schemeClr val="accent1"/>
+          </a:fillRef>
+          <a:effectRef idx="2">
+            <a:schemeClr val="accent1"/>
+          </a:effectRef>
+          <a:fontRef idx="minor">
+            <a:schemeClr val="lt1"/>
+          </a:fontRef>
+        </p:style>
+        <p:txBody>
+          <a:bodyPr rtlCol="0" anchor="ctr"/>
+          <a:lstStyle/>
+          <a:p>
+            <a:r>
+              <a:rPr lang="en-US" sz="3600" b="1" dirty="0">
+                <a:solidFill>
+                  <a:srgbClr val="5B5B5B"/>
+                </a:solidFill>
+              </a:rPr>
               <a:t>What comes to mind when you hear the term “public policy”?</a:t>
             </a:r>
           </a:p>
         </p:txBody>
       </p:sp>
+      <p:sp>
+        <p:nvSpPr>
+          <p:cNvPr id="10" name="Rectangle 9">
+            <a:extLst>
+              <a:ext uri="{FF2B5EF4-FFF2-40B4-BE49-F238E27FC236}">
+                <a16:creationId xmlns:a16="http://schemas.microsoft.com/office/drawing/2014/main" id="{1C0AF95C-0BB4-2693-F48E-2BC1D6E951A7}"/>
+              </a:ext>
+            </a:extLst>
+          </p:cNvPr>
+          <p:cNvSpPr/>
+          <p:nvPr>
+            <p:custDataLst>
+              <p:tags r:id="rId4"/>
+            </p:custDataLst>
+          </p:nvPr>
+        </p:nvSpPr>
+        <p:spPr>
+          <a:xfrm>
+            <a:off x="2926080" y="4318000"/>
+            <a:ext cx="5486400" cy="388620"/>
+          </a:xfrm>
+          <a:prstGeom prst="rect">
+            <a:avLst/>
+          </a:prstGeom>
+          <a:solidFill>
+            <a:srgbClr val="FFFFFF"/>
+          </a:solidFill>
+          <a:ln w="9525" cap="flat" cmpd="sng" algn="ctr">
+            <a:noFill/>
+            <a:prstDash val="solid"/>
+          </a:ln>
+          <a:effectLst>
+            <a:outerShdw blurRad="40000" dist="23000" dir="5400000" rotWithShape="0">
+              <a:srgbClr val="000000">
+                <a:alpha val="35000"/>
+              </a:srgbClr>
+            </a:outerShdw>
+          </a:effectLst>
+          <a:extLst>
+            <a:ext uri="{91240B29-F687-4F45-9708-019B960494DF}">
+              <a14:hiddenLine xmlns:a14="http://schemas.microsoft.com/office/drawing/2010/main" w="9525" cap="flat" cmpd="sng" algn="ctr">
+                <a:solidFill>
+                  <a:schemeClr val="accent1">
+                    <a:shade val="95000"/>
+                    <a:satMod val="105000"/>
+                  </a:schemeClr>
+                </a:solidFill>
+                <a:prstDash val="solid"/>
+              </a14:hiddenLine>
+            </a:ext>
+          </a:extLst>
+        </p:spPr>
+        <p:style>
+          <a:lnRef idx="1">
+            <a:schemeClr val="accent1"/>
+          </a:lnRef>
+          <a:fillRef idx="3">
+            <a:schemeClr val="accent1"/>
+          </a:fillRef>
+          <a:effectRef idx="2">
+            <a:schemeClr val="accent1"/>
+          </a:effectRef>
+          <a:fontRef idx="minor">
+            <a:schemeClr val="lt1"/>
+          </a:fontRef>
+        </p:style>
+        <p:txBody>
+          <a:bodyPr rtlCol="0" anchor="ctr">
+            <a:normAutofit fontScale="85000" lnSpcReduction="10000"/>
+          </a:bodyPr>
+          <a:lstStyle/>
+          <a:p>
+            <a:r>
+              <a:rPr lang="en-US" sz="2200" b="1">
+                <a:solidFill>
+                  <a:srgbClr val="5B5B5B"/>
+                </a:solidFill>
+              </a:rPr>
+              <a:t>ⓘ</a:t>
+            </a:r>
+            <a:r>
+              <a:rPr lang="en-US" sz="2000">
+                <a:solidFill>
+                  <a:srgbClr val="5B5B5B"/>
+                </a:solidFill>
+              </a:rPr>
+              <a:t> Start presenting to display the poll results on this slide.</a:t>
+            </a:r>
+          </a:p>
+        </p:txBody>
+      </p:sp>
     </p:spTree>
+    <p:custDataLst>
+      <p:tags r:id="rId1"/>
+    </p:custDataLst>
+    <p:extLst>
+      <p:ext uri="{BB962C8B-B14F-4D97-AF65-F5344CB8AC3E}">
+        <p14:creationId xmlns:p14="http://schemas.microsoft.com/office/powerpoint/2010/main" val="2307084817"/>
+      </p:ext>
+    </p:extLst>
   </p:cSld>
+  <p:clrMapOvr>
+    <a:masterClrMapping/>
+  </p:clrMapOvr>
 </p:sld>
 </file>
 
@@ -3403,11 +3593,10 @@
           <a:bodyPr/>
           <a:lstStyle/>
           <a:p>
-            <a:pPr lvl="0" indent="0" marL="0">
+            <a:pPr marL="0" lvl="0" indent="0">
               <a:buNone/>
             </a:pPr>
             <a:r>
-              <a:rPr/>
               <a:t>What is Public?</a:t>
             </a:r>
           </a:p>
@@ -3428,7 +3617,7 @@
           <a:bodyPr/>
           <a:lstStyle/>
           <a:p>
-            <a:pPr lvl="0" indent="0" marL="0">
+            <a:pPr marL="0" lvl="0" indent="0">
               <a:buNone/>
             </a:pPr>
             <a:r>
@@ -3436,7 +3625,6 @@
               <a:t>Public</a:t>
             </a:r>
             <a:r>
-              <a:rPr/>
               <a:t> refers to the people, the state, or the government. But also, public …</a:t>
             </a:r>
           </a:p>
@@ -3444,6 +3632,9 @@
       </p:sp>
     </p:spTree>
   </p:cSld>
+  <p:clrMapOvr>
+    <a:masterClrMapping/>
+  </p:clrMapOvr>
 </p:sld>
 </file>
 
@@ -3479,11 +3670,10 @@
           <a:bodyPr/>
           <a:lstStyle/>
           <a:p>
-            <a:pPr lvl="0" indent="0" marL="0">
+            <a:pPr marL="0" lvl="0" indent="0">
               <a:buNone/>
             </a:pPr>
             <a:r>
-              <a:rPr/>
               <a:t>What is Public Policy?</a:t>
             </a:r>
           </a:p>
@@ -3504,7 +3694,7 @@
           <a:bodyPr/>
           <a:lstStyle/>
           <a:p>
-            <a:pPr lvl="0" indent="0" marL="0">
+            <a:pPr marL="0" lvl="0" indent="0">
               <a:buNone/>
             </a:pPr>
             <a:r>
@@ -3512,7 +3702,6 @@
               <a:t>Public Policy</a:t>
             </a:r>
             <a:r>
-              <a:rPr/>
               <a:t> is what officials within government, and by extension the citizens they represent, choose to do or not to do about public problems.</a:t>
             </a:r>
           </a:p>
@@ -3520,6 +3709,9 @@
       </p:sp>
     </p:spTree>
   </p:cSld>
+  <p:clrMapOvr>
+    <a:masterClrMapping/>
+  </p:clrMapOvr>
 </p:sld>
 </file>
 
@@ -3555,11 +3747,10 @@
           <a:bodyPr/>
           <a:lstStyle/>
           <a:p>
-            <a:pPr lvl="0" indent="0" marL="0">
+            <a:pPr marL="0" lvl="0" indent="0">
               <a:buNone/>
             </a:pPr>
             <a:r>
-              <a:rPr/>
               <a:t>Thought Experiment</a:t>
             </a:r>
           </a:p>
@@ -3580,11 +3771,10 @@
           <a:bodyPr/>
           <a:lstStyle/>
           <a:p>
-            <a:pPr lvl="0" indent="0" marL="0">
+            <a:pPr marL="0" lvl="0" indent="0">
               <a:buNone/>
             </a:pPr>
             <a:r>
-              <a:rPr/>
               <a:t>What can you do without government intervention?</a:t>
             </a:r>
           </a:p>
@@ -3592,6 +3782,9 @@
       </p:sp>
     </p:spTree>
   </p:cSld>
+  <p:clrMapOvr>
+    <a:masterClrMapping/>
+  </p:clrMapOvr>
 </p:sld>
 </file>
 
@@ -3627,11 +3820,11 @@
           <a:bodyPr/>
           <a:lstStyle/>
           <a:p>
-            <a:pPr lvl="0" indent="0" marL="0">
+            <a:pPr marL="0" lvl="0" indent="0">
               <a:buNone/>
             </a:pPr>
             <a:r>
-              <a:rPr/>
+              <a:rPr lang="en-US"/>
               <a:t>That’s it for today!</a:t>
             </a:r>
           </a:p>
@@ -3652,19 +3845,131 @@
           <a:bodyPr/>
           <a:lstStyle/>
           <a:p>
-            <a:pPr lvl="0" indent="0" marL="0">
+            <a:pPr marL="0" lvl="0" indent="0">
               <a:buNone/>
             </a:pPr>
             <a:r>
-              <a:rPr/>
+              <a:rPr lang="en-US"/>
               <a:t>Read chapter 1 for next class. See you Thursday!</a:t>
+            </a:r>
+          </a:p>
+        </p:txBody>
+      </p:sp>
+      <p:pic>
+        <p:nvPicPr>
+          <p:cNvPr id="5" name="Picture 4" descr="A cartoon of a person with a mustache and a hat&#10;&#10;Description automatically generated">
+            <a:extLst>
+              <a:ext uri="{FF2B5EF4-FFF2-40B4-BE49-F238E27FC236}">
+                <a16:creationId xmlns:a16="http://schemas.microsoft.com/office/drawing/2014/main" id="{D4B42F04-DF25-9B31-19BD-28EB1E94ABE9}"/>
+              </a:ext>
+            </a:extLst>
+          </p:cNvPr>
+          <p:cNvPicPr>
+            <a:picLocks noChangeAspect="1"/>
+          </p:cNvPicPr>
+          <p:nvPr/>
+        </p:nvPicPr>
+        <p:blipFill>
+          <a:blip r:embed="rId2"/>
+          <a:stretch>
+            <a:fillRect/>
+          </a:stretch>
+        </p:blipFill>
+        <p:spPr>
+          <a:xfrm>
+            <a:off x="6397163" y="1543049"/>
+            <a:ext cx="2579798" cy="3394472"/>
+          </a:xfrm>
+          <a:prstGeom prst="rect">
+            <a:avLst/>
+          </a:prstGeom>
+        </p:spPr>
+      </p:pic>
+      <p:sp>
+        <p:nvSpPr>
+          <p:cNvPr id="6" name="TextBox 5">
+            <a:extLst>
+              <a:ext uri="{FF2B5EF4-FFF2-40B4-BE49-F238E27FC236}">
+                <a16:creationId xmlns:a16="http://schemas.microsoft.com/office/drawing/2014/main" id="{5A858C85-CAAC-1488-9DC9-7024AF7AEA0C}"/>
+              </a:ext>
+            </a:extLst>
+          </p:cNvPr>
+          <p:cNvSpPr txBox="1"/>
+          <p:nvPr/>
+        </p:nvSpPr>
+        <p:spPr>
+          <a:xfrm>
+            <a:off x="682580" y="1893194"/>
+            <a:ext cx="5460643" cy="369332"/>
+          </a:xfrm>
+          <a:prstGeom prst="rect">
+            <a:avLst/>
+          </a:prstGeom>
+          <a:noFill/>
+        </p:spPr>
+        <p:txBody>
+          <a:bodyPr wrap="square" rtlCol="0">
+            <a:spAutoFit/>
+          </a:bodyPr>
+          <a:lstStyle/>
+          <a:p>
+            <a:r>
+              <a:rPr lang="en-US" dirty="0"/>
+              <a:t>Read Kraft and Furlong </a:t>
+            </a:r>
+            <a:r>
+              <a:rPr lang="en-US" dirty="0" err="1"/>
+              <a:t>ch.</a:t>
+            </a:r>
+            <a:r>
+              <a:rPr lang="en-US" dirty="0"/>
+              <a:t> 1</a:t>
             </a:r>
           </a:p>
         </p:txBody>
       </p:sp>
     </p:spTree>
   </p:cSld>
+  <p:clrMapOvr>
+    <a:masterClrMapping/>
+  </p:clrMapOvr>
 </p:sld>
+</file>
+
+<file path=ppt/tags/tag1.xml><?xml version="1.0" encoding="utf-8"?>
+<p:tagLst xmlns:a="http://schemas.openxmlformats.org/drawingml/2006/main" xmlns:r="http://schemas.openxmlformats.org/officeDocument/2006/relationships" xmlns:p="http://schemas.openxmlformats.org/presentationml/2006/main">
+  <p:tag name="SLIDO_APP_VERSION" val="1.5.0.0"/>
+  <p:tag name="SLIDO_PRESENTATION_ID" val="00000000-0000-0000-0000-000000000000"/>
+  <p:tag name="SLIDO_EVENT_UUID" val="d1b35b91-8426-48c8-b8df-02977e78cef0"/>
+  <p:tag name="SLIDO_EVENT_SECTION_UUID" val="704daeee-2886-4fde-be7c-5e61a9ac1b83"/>
+</p:tagLst>
+</file>
+
+<file path=ppt/tags/tag2.xml><?xml version="1.0" encoding="utf-8"?>
+<p:tagLst xmlns:a="http://schemas.openxmlformats.org/drawingml/2006/main" xmlns:r="http://schemas.openxmlformats.org/officeDocument/2006/relationships" xmlns:p="http://schemas.openxmlformats.org/presentationml/2006/main">
+  <p:tag name="SLIDO_TYPE" val="SlidoPoll"/>
+  <p:tag name="SLIDO_POLL_UUID" val="38bef2a8-e4b0-44ab-a37d-a9cab804896b"/>
+  <p:tag name="SLIDO_TIMELINE" val="W3sic2hvd1Jlc3VsdHMiOnRydWUsInBvbGxRdWVzdGlvblV1aWQiOiI1Zjc0ZTI0My05NDRkLTQ4ZmMtYTE3Mi1hYjkxNTMwZmI3NmYifV0="/>
+</p:tagLst>
+</file>
+
+<file path=ppt/tags/tag3.xml><?xml version="1.0" encoding="utf-8"?>
+<p:tagLst xmlns:a="http://schemas.openxmlformats.org/drawingml/2006/main" xmlns:r="http://schemas.openxmlformats.org/officeDocument/2006/relationships" xmlns:p="http://schemas.openxmlformats.org/presentationml/2006/main">
+  <p:tag name="SLIDO_ELEMENT" val="interaction_image"/>
+  <p:tag name="INTERACTION_TYPE" val="wordcloud"/>
+</p:tagLst>
+</file>
+
+<file path=ppt/tags/tag4.xml><?xml version="1.0" encoding="utf-8"?>
+<p:tagLst xmlns:a="http://schemas.openxmlformats.org/drawingml/2006/main" xmlns:r="http://schemas.openxmlformats.org/officeDocument/2006/relationships" xmlns:p="http://schemas.openxmlformats.org/presentationml/2006/main">
+  <p:tag name="SLIDO_ELEMENT" val="title"/>
+</p:tagLst>
+</file>
+
+<file path=ppt/tags/tag5.xml><?xml version="1.0" encoding="utf-8"?>
+<p:tagLst xmlns:a="http://schemas.openxmlformats.org/drawingml/2006/main" xmlns:r="http://schemas.openxmlformats.org/officeDocument/2006/relationships" xmlns:p="http://schemas.openxmlformats.org/presentationml/2006/main">
+  <p:tag name="SLIDO_ELEMENT" val="footer"/>
+</p:tagLst>
 </file>
 
 <file path=ppt/theme/theme1.xml><?xml version="1.0" encoding="utf-8"?>
@@ -3985,265 +4290,4 @@
   </a:objectDefaults>
   <a:extraClrSchemeLst/>
 </a:theme>
-</file>
-
-<file path=ppt/theme/theme2.xml><?xml version="1.0" encoding="utf-8"?>
-<a:theme xmlns:a="http://schemas.openxmlformats.org/drawingml/2006/main" name="Office Theme">
-  <a:themeElements>
-    <a:clrScheme name="Office">
-      <a:dk1>
-        <a:sysClr val="windowText" lastClr="000000"/>
-      </a:dk1>
-      <a:lt1>
-        <a:sysClr val="window" lastClr="FFFFFF"/>
-      </a:lt1>
-      <a:dk2>
-        <a:srgbClr val="44546A"/>
-      </a:dk2>
-      <a:lt2>
-        <a:srgbClr val="E7E6E6"/>
-      </a:lt2>
-      <a:accent1>
-        <a:srgbClr val="5B9BD5"/>
-      </a:accent1>
-      <a:accent2>
-        <a:srgbClr val="ED7D31"/>
-      </a:accent2>
-      <a:accent3>
-        <a:srgbClr val="A5A5A5"/>
-      </a:accent3>
-      <a:accent4>
-        <a:srgbClr val="FFC000"/>
-      </a:accent4>
-      <a:accent5>
-        <a:srgbClr val="4472C4"/>
-      </a:accent5>
-      <a:accent6>
-        <a:srgbClr val="70AD47"/>
-      </a:accent6>
-      <a:hlink>
-        <a:srgbClr val="0563C1"/>
-      </a:hlink>
-      <a:folHlink>
-        <a:srgbClr val="954F72"/>
-      </a:folHlink>
-    </a:clrScheme>
-    <a:fontScheme name="Office">
-      <a:majorFont>
-        <a:latin typeface="Calibri Light" panose="020F0302020204030204"/>
-        <a:ea typeface=""/>
-        <a:cs typeface=""/>
-        <a:font script="Jpan" typeface="ＭＳ Ｐゴシック"/>
-        <a:font script="Hang" typeface="맑은 고딕"/>
-        <a:font script="Hans" typeface="宋体"/>
-        <a:font script="Hant" typeface="新細明體"/>
-        <a:font script="Arab" typeface="Times New Roman"/>
-        <a:font script="Hebr" typeface="Times New Roman"/>
-        <a:font script="Thai" typeface="Angsana New"/>
-        <a:font script="Ethi" typeface="Nyala"/>
-        <a:font script="Beng" typeface="Vrinda"/>
-        <a:font script="Gujr" typeface="Shruti"/>
-        <a:font script="Khmr" typeface="MoolBoran"/>
-        <a:font script="Knda" typeface="Tunga"/>
-        <a:font script="Guru" typeface="Raavi"/>
-        <a:font script="Cans" typeface="Euphemia"/>
-        <a:font script="Cher" typeface="Plantagenet Cherokee"/>
-        <a:font script="Yiii" typeface="Microsoft Yi Baiti"/>
-        <a:font script="Tibt" typeface="Microsoft Himalaya"/>
-        <a:font script="Thaa" typeface="MV Boli"/>
-        <a:font script="Deva" typeface="Mangal"/>
-        <a:font script="Telu" typeface="Gautami"/>
-        <a:font script="Taml" typeface="Latha"/>
-        <a:font script="Syrc" typeface="Estrangelo Edessa"/>
-        <a:font script="Orya" typeface="Kalinga"/>
-        <a:font script="Mlym" typeface="Kartika"/>
-        <a:font script="Laoo" typeface="DokChampa"/>
-        <a:font script="Sinh" typeface="Iskoola Pota"/>
-        <a:font script="Mong" typeface="Mongolian Baiti"/>
-        <a:font script="Viet" typeface="Times New Roman"/>
-        <a:font script="Uigh" typeface="Microsoft Uighur"/>
-        <a:font script="Geor" typeface="Sylfaen"/>
-      </a:majorFont>
-      <a:minorFont>
-        <a:latin typeface="Calibri" panose="020F0502020204030204"/>
-        <a:ea typeface=""/>
-        <a:cs typeface=""/>
-        <a:font script="Jpan" typeface="ＭＳ Ｐゴシック"/>
-        <a:font script="Hang" typeface="맑은 고딕"/>
-        <a:font script="Hans" typeface="宋体"/>
-        <a:font script="Hant" typeface="新細明體"/>
-        <a:font script="Arab" typeface="Arial"/>
-        <a:font script="Hebr" typeface="Arial"/>
-        <a:font script="Thai" typeface="Cordia New"/>
-        <a:font script="Ethi" typeface="Nyala"/>
-        <a:font script="Beng" typeface="Vrinda"/>
-        <a:font script="Gujr" typeface="Shruti"/>
-        <a:font script="Khmr" typeface="DaunPenh"/>
-        <a:font script="Knda" typeface="Tunga"/>
-        <a:font script="Guru" typeface="Raavi"/>
-        <a:font script="Cans" typeface="Euphemia"/>
-        <a:font script="Cher" typeface="Plantagenet Cherokee"/>
-        <a:font script="Yiii" typeface="Microsoft Yi Baiti"/>
-        <a:font script="Tibt" typeface="Microsoft Himalaya"/>
-        <a:font script="Thaa" typeface="MV Boli"/>
-        <a:font script="Deva" typeface="Mangal"/>
-        <a:font script="Telu" typeface="Gautami"/>
-        <a:font script="Taml" typeface="Latha"/>
-        <a:font script="Syrc" typeface="Estrangelo Edessa"/>
-        <a:font script="Orya" typeface="Kalinga"/>
-        <a:font script="Mlym" typeface="Kartika"/>
-        <a:font script="Laoo" typeface="DokChampa"/>
-        <a:font script="Sinh" typeface="Iskoola Pota"/>
-        <a:font script="Mong" typeface="Mongolian Baiti"/>
-        <a:font script="Viet" typeface="Arial"/>
-        <a:font script="Uigh" typeface="Microsoft Uighur"/>
-        <a:font script="Geor" typeface="Sylfaen"/>
-      </a:minorFont>
-    </a:fontScheme>
-    <a:fmtScheme name="Office">
-      <a:fillStyleLst>
-        <a:solidFill>
-          <a:schemeClr val="phClr"/>
-        </a:solidFill>
-        <a:gradFill rotWithShape="1">
-          <a:gsLst>
-            <a:gs pos="0">
-              <a:schemeClr val="phClr">
-                <a:lumMod val="110000"/>
-                <a:satMod val="105000"/>
-                <a:tint val="67000"/>
-              </a:schemeClr>
-            </a:gs>
-            <a:gs pos="50000">
-              <a:schemeClr val="phClr">
-                <a:lumMod val="105000"/>
-                <a:satMod val="103000"/>
-                <a:tint val="73000"/>
-              </a:schemeClr>
-            </a:gs>
-            <a:gs pos="100000">
-              <a:schemeClr val="phClr">
-                <a:lumMod val="105000"/>
-                <a:satMod val="109000"/>
-                <a:tint val="81000"/>
-              </a:schemeClr>
-            </a:gs>
-          </a:gsLst>
-          <a:lin ang="5400000" scaled="0"/>
-        </a:gradFill>
-        <a:gradFill rotWithShape="1">
-          <a:gsLst>
-            <a:gs pos="0">
-              <a:schemeClr val="phClr">
-                <a:satMod val="103000"/>
-                <a:lumMod val="102000"/>
-                <a:tint val="94000"/>
-              </a:schemeClr>
-            </a:gs>
-            <a:gs pos="50000">
-              <a:schemeClr val="phClr">
-                <a:satMod val="110000"/>
-                <a:lumMod val="100000"/>
-                <a:shade val="100000"/>
-              </a:schemeClr>
-            </a:gs>
-            <a:gs pos="100000">
-              <a:schemeClr val="phClr">
-                <a:lumMod val="99000"/>
-                <a:satMod val="120000"/>
-                <a:shade val="78000"/>
-              </a:schemeClr>
-            </a:gs>
-          </a:gsLst>
-          <a:lin ang="5400000" scaled="0"/>
-        </a:gradFill>
-      </a:fillStyleLst>
-      <a:lnStyleLst>
-        <a:ln w="6350" cap="flat" cmpd="sng" algn="ctr">
-          <a:solidFill>
-            <a:schemeClr val="phClr"/>
-          </a:solidFill>
-          <a:prstDash val="solid"/>
-          <a:miter lim="800000"/>
-        </a:ln>
-        <a:ln w="12700" cap="flat" cmpd="sng" algn="ctr">
-          <a:solidFill>
-            <a:schemeClr val="phClr"/>
-          </a:solidFill>
-          <a:prstDash val="solid"/>
-          <a:miter lim="800000"/>
-        </a:ln>
-        <a:ln w="19050" cap="flat" cmpd="sng" algn="ctr">
-          <a:solidFill>
-            <a:schemeClr val="phClr"/>
-          </a:solidFill>
-          <a:prstDash val="solid"/>
-          <a:miter lim="800000"/>
-        </a:ln>
-      </a:lnStyleLst>
-      <a:effectStyleLst>
-        <a:effectStyle>
-          <a:effectLst/>
-        </a:effectStyle>
-        <a:effectStyle>
-          <a:effectLst/>
-        </a:effectStyle>
-        <a:effectStyle>
-          <a:effectLst>
-            <a:outerShdw blurRad="57150" dist="19050" dir="5400000" algn="ctr" rotWithShape="0">
-              <a:srgbClr val="000000">
-                <a:alpha val="63000"/>
-              </a:srgbClr>
-            </a:outerShdw>
-          </a:effectLst>
-        </a:effectStyle>
-      </a:effectStyleLst>
-      <a:bgFillStyleLst>
-        <a:solidFill>
-          <a:schemeClr val="phClr"/>
-        </a:solidFill>
-        <a:solidFill>
-          <a:schemeClr val="phClr">
-            <a:tint val="95000"/>
-            <a:satMod val="170000"/>
-          </a:schemeClr>
-        </a:solidFill>
-        <a:gradFill rotWithShape="1">
-          <a:gsLst>
-            <a:gs pos="0">
-              <a:schemeClr val="phClr">
-                <a:tint val="93000"/>
-                <a:satMod val="150000"/>
-                <a:shade val="98000"/>
-                <a:lumMod val="102000"/>
-              </a:schemeClr>
-            </a:gs>
-            <a:gs pos="50000">
-              <a:schemeClr val="phClr">
-                <a:tint val="98000"/>
-                <a:satMod val="130000"/>
-                <a:shade val="90000"/>
-                <a:lumMod val="103000"/>
-              </a:schemeClr>
-            </a:gs>
-            <a:gs pos="100000">
-              <a:schemeClr val="phClr">
-                <a:shade val="63000"/>
-                <a:satMod val="120000"/>
-              </a:schemeClr>
-            </a:gs>
-          </a:gsLst>
-          <a:lin ang="5400000" scaled="0"/>
-        </a:gradFill>
-      </a:bgFillStyleLst>
-    </a:fmtScheme>
-  </a:themeElements>
-  <a:objectDefaults/>
-  <a:extraClrSchemeLst/>
-  <a:extLst>
-    <a:ext uri="{05A4C25C-085E-4340-85A3-A5531E510DB2}">
-      <thm15:themeFamily xmlns:thm15="http://schemas.microsoft.com/office/thememl/2012/main" name="Office Theme" id="{62F939B6-93AF-4DB8-9C6B-D6C7DFDC589F}" vid="{4A3C46E8-61CC-4603-A589-7422A47A8E4A}"/>
-    </a:ext>
-  </a:extLst>
-</a:theme>
 </file>
</xml_diff>